<commit_message>
final exam data is posted
</commit_message>
<xml_diff>
--- a/slides/pyspark/dataframes_slides/7.1_intro_to_dataframes.pptx
+++ b/slides/pyspark/dataframes_slides/7.1_intro_to_dataframes.pptx
@@ -1527,7 +1527,7 @@
           <a:p>
             <a:fld id="{B9BF1A25-DA02-B94D-83E7-38F452A4DD0B}" type="datetimeFigureOut">
               <a:rPr lang="en-US" smtClean="0"/>
-              <a:t>2/25/23</a:t>
+              <a:t>5/17/23</a:t>
             </a:fld>
             <a:endParaRPr lang="en-US" dirty="0"/>
           </a:p>
@@ -1693,7 +1693,7 @@
           <a:p>
             <a:fld id="{773D608E-326B-064D-8838-D0E4D51BA537}" type="datetimeFigureOut">
               <a:rPr lang="en-US" smtClean="0"/>
-              <a:t>2/25/23</a:t>
+              <a:t>5/17/23</a:t>
             </a:fld>
             <a:endParaRPr lang="en-US" dirty="0"/>
           </a:p>
@@ -11465,14 +11465,14 @@
           </a:ln>
           <a:extLst>
             <a:ext uri="{909E8E84-426E-40dd-AFC4-6F175D3DCCD1}">
-              <a14:hiddenFill xmlns:a14="http://schemas.microsoft.com/office/drawing/2010/main" xmlns="">
+              <a14:hiddenFill xmlns="" xmlns:a14="http://schemas.microsoft.com/office/drawing/2010/main">
                 <a:solidFill>
                   <a:srgbClr val="FFFFFF"/>
                 </a:solidFill>
               </a14:hiddenFill>
             </a:ext>
             <a:ext uri="{91240B29-F687-4f45-9708-019B960494DF}">
-              <a14:hiddenLine xmlns:a14="http://schemas.microsoft.com/office/drawing/2010/main" xmlns="" w="9525">
+              <a14:hiddenLine xmlns="" xmlns:a14="http://schemas.microsoft.com/office/drawing/2010/main" w="9525">
                 <a:solidFill>
                   <a:srgbClr val="000000"/>
                 </a:solidFill>
@@ -16516,7 +16516,7 @@
         </p:spPr>
         <p:txBody>
           <a:bodyPr>
-            <a:normAutofit fontScale="47500" lnSpcReduction="20000"/>
+            <a:normAutofit fontScale="40000" lnSpcReduction="20000"/>
           </a:bodyPr>
           <a:lstStyle/>
           <a:p>
@@ -16579,6 +16579,29 @@
               </a:rPr>
               <a:t> = ['name', 'age', 'salary’]</a:t>
             </a:r>
+          </a:p>
+          <a:p>
+            <a:pPr marL="0" indent="0">
+              <a:buNone/>
+            </a:pPr>
+            <a:r>
+              <a:rPr lang="en-US" dirty="0">
+                <a:latin typeface="Consolas" panose="020B0609020204030204" pitchFamily="49" charset="0"/>
+                <a:cs typeface="Consolas" panose="020B0609020204030204" pitchFamily="49" charset="0"/>
+              </a:rPr>
+              <a:t>&gt;&gt;&gt; # data is a </a:t>
+            </a:r>
+            <a:r>
+              <a:rPr lang="en-US">
+                <a:latin typeface="Consolas" panose="020B0609020204030204" pitchFamily="49" charset="0"/>
+                <a:cs typeface="Consolas" panose="020B0609020204030204" pitchFamily="49" charset="0"/>
+              </a:rPr>
+              <a:t>Python Collection</a:t>
+            </a:r>
+            <a:endParaRPr lang="en-US" dirty="0">
+              <a:latin typeface="Consolas" panose="020B0609020204030204" pitchFamily="49" charset="0"/>
+              <a:cs typeface="Consolas" panose="020B0609020204030204" pitchFamily="49" charset="0"/>
+            </a:endParaRPr>
           </a:p>
           <a:p>
             <a:pPr marL="0" indent="0">

</xml_diff>